<commit_message>
o updates slides for 2020 Fall...
</commit_message>
<xml_diff>
--- a/setupVSCode_and_JDK/000-Setup VS Code and JDK.pptx
+++ b/setupVSCode_and_JDK/000-Setup VS Code and JDK.pptx
@@ -5,13 +5,12 @@
     <p:sldMasterId id="2147483648" r:id="rId1"/>
   </p:sldMasterIdLst>
   <p:sldIdLst>
-    <p:sldId id="263" r:id="rId2"/>
-    <p:sldId id="264" r:id="rId3"/>
-    <p:sldId id="265" r:id="rId4"/>
-    <p:sldId id="262" r:id="rId5"/>
-    <p:sldId id="268" r:id="rId6"/>
-    <p:sldId id="266" r:id="rId7"/>
-    <p:sldId id="267" r:id="rId8"/>
+    <p:sldId id="269" r:id="rId2"/>
+    <p:sldId id="263" r:id="rId3"/>
+    <p:sldId id="264" r:id="rId4"/>
+    <p:sldId id="265" r:id="rId5"/>
+    <p:sldId id="262" r:id="rId6"/>
+    <p:sldId id="268" r:id="rId7"/>
   </p:sldIdLst>
   <p:sldSz cx="12192000" cy="6858000"/>
   <p:notesSz cx="6858000" cy="9144000"/>
@@ -249,7 +248,7 @@
           <a:p>
             <a:fld id="{DFB8C107-6F8D-4B21-8691-4E1EDA2C9733}" type="datetimeFigureOut">
               <a:rPr lang="en-US" smtClean="0"/>
-              <a:t>6/25/2019</a:t>
+              <a:t>9/7/2020</a:t>
             </a:fld>
             <a:endParaRPr lang="en-US"/>
           </a:p>
@@ -419,7 +418,7 @@
           <a:p>
             <a:fld id="{DFB8C107-6F8D-4B21-8691-4E1EDA2C9733}" type="datetimeFigureOut">
               <a:rPr lang="en-US" smtClean="0"/>
-              <a:t>6/25/2019</a:t>
+              <a:t>9/7/2020</a:t>
             </a:fld>
             <a:endParaRPr lang="en-US"/>
           </a:p>
@@ -599,7 +598,7 @@
           <a:p>
             <a:fld id="{DFB8C107-6F8D-4B21-8691-4E1EDA2C9733}" type="datetimeFigureOut">
               <a:rPr lang="en-US" smtClean="0"/>
-              <a:t>6/25/2019</a:t>
+              <a:t>9/7/2020</a:t>
             </a:fld>
             <a:endParaRPr lang="en-US"/>
           </a:p>
@@ -769,7 +768,7 @@
           <a:p>
             <a:fld id="{DFB8C107-6F8D-4B21-8691-4E1EDA2C9733}" type="datetimeFigureOut">
               <a:rPr lang="en-US" smtClean="0"/>
-              <a:t>6/25/2019</a:t>
+              <a:t>9/7/2020</a:t>
             </a:fld>
             <a:endParaRPr lang="en-US"/>
           </a:p>
@@ -1015,7 +1014,7 @@
           <a:p>
             <a:fld id="{DFB8C107-6F8D-4B21-8691-4E1EDA2C9733}" type="datetimeFigureOut">
               <a:rPr lang="en-US" smtClean="0"/>
-              <a:t>6/25/2019</a:t>
+              <a:t>9/7/2020</a:t>
             </a:fld>
             <a:endParaRPr lang="en-US"/>
           </a:p>
@@ -1247,7 +1246,7 @@
           <a:p>
             <a:fld id="{DFB8C107-6F8D-4B21-8691-4E1EDA2C9733}" type="datetimeFigureOut">
               <a:rPr lang="en-US" smtClean="0"/>
-              <a:t>6/25/2019</a:t>
+              <a:t>9/7/2020</a:t>
             </a:fld>
             <a:endParaRPr lang="en-US"/>
           </a:p>
@@ -1614,7 +1613,7 @@
           <a:p>
             <a:fld id="{DFB8C107-6F8D-4B21-8691-4E1EDA2C9733}" type="datetimeFigureOut">
               <a:rPr lang="en-US" smtClean="0"/>
-              <a:t>6/25/2019</a:t>
+              <a:t>9/7/2020</a:t>
             </a:fld>
             <a:endParaRPr lang="en-US"/>
           </a:p>
@@ -1732,7 +1731,7 @@
           <a:p>
             <a:fld id="{DFB8C107-6F8D-4B21-8691-4E1EDA2C9733}" type="datetimeFigureOut">
               <a:rPr lang="en-US" smtClean="0"/>
-              <a:t>6/25/2019</a:t>
+              <a:t>9/7/2020</a:t>
             </a:fld>
             <a:endParaRPr lang="en-US"/>
           </a:p>
@@ -1827,7 +1826,7 @@
           <a:p>
             <a:fld id="{DFB8C107-6F8D-4B21-8691-4E1EDA2C9733}" type="datetimeFigureOut">
               <a:rPr lang="en-US" smtClean="0"/>
-              <a:t>6/25/2019</a:t>
+              <a:t>9/7/2020</a:t>
             </a:fld>
             <a:endParaRPr lang="en-US"/>
           </a:p>
@@ -2104,7 +2103,7 @@
           <a:p>
             <a:fld id="{DFB8C107-6F8D-4B21-8691-4E1EDA2C9733}" type="datetimeFigureOut">
               <a:rPr lang="en-US" smtClean="0"/>
-              <a:t>6/25/2019</a:t>
+              <a:t>9/7/2020</a:t>
             </a:fld>
             <a:endParaRPr lang="en-US"/>
           </a:p>
@@ -2357,7 +2356,7 @@
           <a:p>
             <a:fld id="{DFB8C107-6F8D-4B21-8691-4E1EDA2C9733}" type="datetimeFigureOut">
               <a:rPr lang="en-US" smtClean="0"/>
-              <a:t>6/25/2019</a:t>
+              <a:t>9/7/2020</a:t>
             </a:fld>
             <a:endParaRPr lang="en-US"/>
           </a:p>
@@ -2570,7 +2569,7 @@
           <a:p>
             <a:fld id="{DFB8C107-6F8D-4B21-8691-4E1EDA2C9733}" type="datetimeFigureOut">
               <a:rPr lang="en-US" smtClean="0"/>
-              <a:t>6/25/2019</a:t>
+              <a:t>9/7/2020</a:t>
             </a:fld>
             <a:endParaRPr lang="en-US"/>
           </a:p>
@@ -2977,6 +2976,29 @@
       </p:grpSpPr>
       <p:sp>
         <p:nvSpPr>
+          <p:cNvPr id="2" name="Title 1"/>
+          <p:cNvSpPr>
+            <a:spLocks noGrp="1"/>
+          </p:cNvSpPr>
+          <p:nvPr>
+            <p:ph type="title"/>
+          </p:nvPr>
+        </p:nvSpPr>
+        <p:spPr/>
+        <p:txBody>
+          <a:bodyPr/>
+          <a:lstStyle/>
+          <a:p>
+            <a:r>
+              <a:rPr lang="en-US" dirty="0" smtClean="0"/>
+              <a:t>These Steps are also on my YouTube Channel</a:t>
+            </a:r>
+            <a:endParaRPr lang="en-US" dirty="0"/>
+          </a:p>
+        </p:txBody>
+      </p:sp>
+      <p:sp>
+        <p:nvSpPr>
           <p:cNvPr id="3" name="Content Placeholder 2"/>
           <p:cNvSpPr>
             <a:spLocks noGrp="1"/>
@@ -2985,21 +3007,10 @@
             <p:ph idx="1"/>
           </p:nvPr>
         </p:nvSpPr>
-        <p:spPr>
-          <a:xfrm>
-            <a:off x="77804" y="102703"/>
-            <a:ext cx="10515600" cy="4351338"/>
-          </a:xfrm>
-        </p:spPr>
-        <p:txBody>
-          <a:bodyPr/>
-          <a:lstStyle/>
-          <a:p>
-            <a:r>
-              <a:rPr lang="en-US" dirty="0" smtClean="0"/>
-              <a:t>Download and install Java JDK</a:t>
-            </a:r>
-          </a:p>
+        <p:spPr/>
+        <p:txBody>
+          <a:bodyPr/>
+          <a:lstStyle/>
           <a:p>
             <a:r>
               <a:rPr lang="en-US" dirty="0">
@@ -3011,43 +3022,90 @@
               <a:rPr lang="en-US" dirty="0" smtClean="0">
                 <a:hlinkClick r:id="rId2"/>
               </a:rPr>
-              <a:t>www.oracle.com/technetwork/java/javase/downloads/index.html</a:t>
+              <a:t>youtu.be/6LCYam-GgjE</a:t>
             </a:r>
             <a:endParaRPr lang="en-US" dirty="0" smtClean="0"/>
           </a:p>
           <a:p>
-            <a:endParaRPr lang="en-US" dirty="0"/>
-          </a:p>
-        </p:txBody>
-      </p:sp>
-      <p:pic>
-        <p:nvPicPr>
-          <p:cNvPr id="4" name="Picture 3"/>
-          <p:cNvPicPr>
-            <a:picLocks noChangeAspect="1"/>
-          </p:cNvPicPr>
-          <p:nvPr/>
-        </p:nvPicPr>
-        <p:blipFill>
-          <a:blip r:embed="rId3"/>
-          <a:stretch>
-            <a:fillRect/>
-          </a:stretch>
-        </p:blipFill>
-        <p:spPr>
-          <a:xfrm>
-            <a:off x="1760420" y="1060661"/>
-            <a:ext cx="8832984" cy="5961686"/>
-          </a:xfrm>
-          <a:prstGeom prst="rect">
-            <a:avLst/>
-          </a:prstGeom>
-        </p:spPr>
-      </p:pic>
+            <a:r>
+              <a:rPr lang="en-US" dirty="0"/>
+              <a:t>Step-by-step instructions to: </a:t>
+            </a:r>
+            <a:endParaRPr lang="en-US" dirty="0" smtClean="0"/>
+          </a:p>
+          <a:p>
+            <a:pPr lvl="1"/>
+            <a:r>
+              <a:rPr lang="en-US" dirty="0" smtClean="0"/>
+              <a:t>1</a:t>
+            </a:r>
+            <a:r>
+              <a:rPr lang="en-US" dirty="0"/>
+              <a:t>) Download and install </a:t>
+            </a:r>
+            <a:r>
+              <a:rPr lang="en-US" dirty="0" err="1"/>
+              <a:t>OpenJDK</a:t>
+            </a:r>
+            <a:r>
+              <a:rPr lang="en-US" dirty="0"/>
+              <a:t> </a:t>
+            </a:r>
+            <a:endParaRPr lang="en-US" dirty="0" smtClean="0"/>
+          </a:p>
+          <a:p>
+            <a:pPr lvl="1"/>
+            <a:r>
+              <a:rPr lang="en-US" dirty="0" smtClean="0"/>
+              <a:t>2</a:t>
+            </a:r>
+            <a:r>
+              <a:rPr lang="en-US" dirty="0"/>
+              <a:t>) Unzip </a:t>
+            </a:r>
+            <a:r>
+              <a:rPr lang="en-US" dirty="0" err="1"/>
+              <a:t>OpenJDK</a:t>
+            </a:r>
+            <a:r>
+              <a:rPr lang="en-US" dirty="0"/>
+              <a:t> onto your hard drive </a:t>
+            </a:r>
+            <a:endParaRPr lang="en-US" dirty="0" smtClean="0"/>
+          </a:p>
+          <a:p>
+            <a:pPr lvl="1"/>
+            <a:r>
+              <a:rPr lang="en-US" smtClean="0"/>
+              <a:t>3</a:t>
+            </a:r>
+            <a:r>
+              <a:rPr lang="en-US" dirty="0"/>
+              <a:t>) Set your system path so java.exe and javac.exe are </a:t>
+            </a:r>
+            <a:r>
+              <a:rPr lang="en-US"/>
+              <a:t>found </a:t>
+            </a:r>
+            <a:endParaRPr lang="en-US" smtClean="0"/>
+          </a:p>
+          <a:p>
+            <a:pPr lvl="1"/>
+            <a:r>
+              <a:rPr lang="en-US" smtClean="0"/>
+              <a:t>4</a:t>
+            </a:r>
+            <a:r>
+              <a:rPr lang="en-US" dirty="0"/>
+              <a:t>) Install VS Code and the Java Extension Pack to run Java from your IDE.</a:t>
+            </a:r>
+          </a:p>
+        </p:txBody>
+      </p:sp>
     </p:spTree>
     <p:extLst>
       <p:ext uri="{BB962C8B-B14F-4D97-AF65-F5344CB8AC3E}">
-        <p14:creationId xmlns:p14="http://schemas.microsoft.com/office/powerpoint/2010/main" val="3584495186"/>
+        <p14:creationId xmlns:p14="http://schemas.microsoft.com/office/powerpoint/2010/main" val="835533259"/>
       </p:ext>
     </p:extLst>
   </p:cSld>
@@ -3096,35 +3154,47 @@
           <a:p>
             <a:r>
               <a:rPr lang="en-US" dirty="0" smtClean="0"/>
-              <a:t>After installing the JDK, we need to add the binaries into the environment’s path</a:t>
-            </a:r>
-          </a:p>
-          <a:p>
-            <a:r>
-              <a:rPr lang="en-US" sz="2400" dirty="0"/>
-              <a:t>C:\Program Files\Java\jdk-12.0.1\bin</a:t>
-            </a:r>
+              <a:t>Download and install Java JDK (Java Compiler + Java Runtime)</a:t>
+            </a:r>
+          </a:p>
+          <a:p>
+            <a:r>
+              <a:rPr lang="en-US" dirty="0">
+                <a:hlinkClick r:id="rId2"/>
+              </a:rPr>
+              <a:t>https://jdk.java.net/14</a:t>
+            </a:r>
+            <a:r>
+              <a:rPr lang="en-US" dirty="0" smtClean="0">
+                <a:hlinkClick r:id="rId2"/>
+              </a:rPr>
+              <a:t>/</a:t>
+            </a:r>
+            <a:endParaRPr lang="en-US" dirty="0" smtClean="0"/>
+          </a:p>
+          <a:p>
+            <a:endParaRPr lang="en-US" dirty="0"/>
           </a:p>
         </p:txBody>
       </p:sp>
       <p:pic>
         <p:nvPicPr>
-          <p:cNvPr id="5" name="Picture 4"/>
+          <p:cNvPr id="6" name="Picture 5"/>
           <p:cNvPicPr>
             <a:picLocks noChangeAspect="1"/>
           </p:cNvPicPr>
           <p:nvPr/>
         </p:nvPicPr>
         <p:blipFill>
-          <a:blip r:embed="rId2"/>
+          <a:blip r:embed="rId3"/>
           <a:stretch>
             <a:fillRect/>
           </a:stretch>
         </p:blipFill>
         <p:spPr>
           <a:xfrm>
-            <a:off x="5102341" y="105878"/>
-            <a:ext cx="6938445" cy="6853890"/>
+            <a:off x="2534418" y="991384"/>
+            <a:ext cx="6560422" cy="5712525"/>
           </a:xfrm>
           <a:prstGeom prst="rect">
             <a:avLst/>
@@ -3134,7 +3204,7 @@
     </p:spTree>
     <p:extLst>
       <p:ext uri="{BB962C8B-B14F-4D97-AF65-F5344CB8AC3E}">
-        <p14:creationId xmlns:p14="http://schemas.microsoft.com/office/powerpoint/2010/main" val="1161958074"/>
+        <p14:creationId xmlns:p14="http://schemas.microsoft.com/office/powerpoint/2010/main" val="3584495186"/>
       </p:ext>
     </p:extLst>
   </p:cSld>
@@ -3163,158 +3233,72 @@
       </p:grpSpPr>
       <p:sp>
         <p:nvSpPr>
-          <p:cNvPr id="2" name="Title 1"/>
-          <p:cNvSpPr>
-            <a:spLocks noGrp="1"/>
-          </p:cNvSpPr>
-          <p:nvPr>
-            <p:ph type="title"/>
-          </p:nvPr>
-        </p:nvSpPr>
-        <p:spPr/>
+          <p:cNvPr id="3" name="Content Placeholder 2"/>
+          <p:cNvSpPr>
+            <a:spLocks noGrp="1"/>
+          </p:cNvSpPr>
+          <p:nvPr>
+            <p:ph idx="1"/>
+          </p:nvPr>
+        </p:nvSpPr>
+        <p:spPr>
+          <a:xfrm>
+            <a:off x="0" y="0"/>
+            <a:ext cx="4689987" cy="4351338"/>
+          </a:xfrm>
+        </p:spPr>
         <p:txBody>
           <a:bodyPr/>
           <a:lstStyle/>
           <a:p>
             <a:r>
               <a:rPr lang="en-US" dirty="0" smtClean="0"/>
-              <a:t>Test path works properly</a:t>
-            </a:r>
-            <a:endParaRPr lang="en-US" dirty="0"/>
-          </a:p>
-        </p:txBody>
-      </p:sp>
-      <p:sp>
-        <p:nvSpPr>
-          <p:cNvPr id="3" name="Content Placeholder 2"/>
-          <p:cNvSpPr>
-            <a:spLocks noGrp="1"/>
-          </p:cNvSpPr>
-          <p:nvPr>
-            <p:ph idx="1"/>
-          </p:nvPr>
-        </p:nvSpPr>
-        <p:spPr/>
-        <p:txBody>
-          <a:bodyPr/>
-          <a:lstStyle/>
+              <a:t>After installing the JDK, we need to add the binaries into the environment’s path</a:t>
+            </a:r>
+          </a:p>
           <a:p>
             <a:r>
               <a:rPr lang="en-US" dirty="0" smtClean="0"/>
-              <a:t>Open an command window and type “</a:t>
-            </a:r>
-            <a:r>
-              <a:rPr lang="en-US" dirty="0" err="1" smtClean="0"/>
-              <a:t>javac</a:t>
-            </a:r>
-            <a:r>
-              <a:rPr lang="en-US" dirty="0" smtClean="0"/>
-              <a:t>” (java compiler)</a:t>
-            </a:r>
-          </a:p>
-          <a:p>
-            <a:r>
-              <a:rPr lang="en-US" dirty="0" smtClean="0">
-                <a:latin typeface="Consolas" panose="020B0609020204030204" pitchFamily="49" charset="0"/>
-              </a:rPr>
-              <a:t>C</a:t>
-            </a:r>
-            <a:r>
-              <a:rPr lang="en-US" dirty="0">
-                <a:latin typeface="Consolas" panose="020B0609020204030204" pitchFamily="49" charset="0"/>
-              </a:rPr>
-              <a:t>:\Users\user&gt;javac</a:t>
-            </a:r>
-          </a:p>
-          <a:p>
-            <a:pPr marL="0" indent="0">
-              <a:buNone/>
-            </a:pPr>
-            <a:r>
-              <a:rPr lang="en-US" dirty="0" smtClean="0">
-                <a:latin typeface="Consolas" panose="020B0609020204030204" pitchFamily="49" charset="0"/>
-              </a:rPr>
-              <a:t>	Usage</a:t>
-            </a:r>
-            <a:r>
-              <a:rPr lang="en-US" dirty="0">
-                <a:latin typeface="Consolas" panose="020B0609020204030204" pitchFamily="49" charset="0"/>
-              </a:rPr>
-              <a:t>: </a:t>
-            </a:r>
-            <a:r>
-              <a:rPr lang="en-US" dirty="0" err="1">
-                <a:latin typeface="Consolas" panose="020B0609020204030204" pitchFamily="49" charset="0"/>
-              </a:rPr>
-              <a:t>javac</a:t>
-            </a:r>
-            <a:r>
-              <a:rPr lang="en-US" dirty="0">
-                <a:latin typeface="Consolas" panose="020B0609020204030204" pitchFamily="49" charset="0"/>
-              </a:rPr>
-              <a:t> &lt;options&gt; &lt;source files&gt;</a:t>
-            </a:r>
-          </a:p>
-          <a:p>
-            <a:pPr marL="0" indent="0">
-              <a:buNone/>
-            </a:pPr>
-            <a:r>
-              <a:rPr lang="en-US" dirty="0" smtClean="0">
-                <a:latin typeface="Consolas" panose="020B0609020204030204" pitchFamily="49" charset="0"/>
-              </a:rPr>
-              <a:t>	where </a:t>
-            </a:r>
-            <a:r>
-              <a:rPr lang="en-US" dirty="0">
-                <a:latin typeface="Consolas" panose="020B0609020204030204" pitchFamily="49" charset="0"/>
-              </a:rPr>
-              <a:t>possible options include</a:t>
-            </a:r>
-            <a:r>
-              <a:rPr lang="en-US" dirty="0" smtClean="0">
-                <a:latin typeface="Consolas" panose="020B0609020204030204" pitchFamily="49" charset="0"/>
-              </a:rPr>
-              <a:t>:</a:t>
-            </a:r>
-          </a:p>
-          <a:p>
-            <a:r>
-              <a:rPr lang="en-US" dirty="0" err="1" smtClean="0">
-                <a:latin typeface="Consolas" panose="020B0609020204030204" pitchFamily="49" charset="0"/>
-              </a:rPr>
-              <a:t>Javac</a:t>
-            </a:r>
-            <a:r>
-              <a:rPr lang="en-US" dirty="0" smtClean="0">
-                <a:latin typeface="Consolas" panose="020B0609020204030204" pitchFamily="49" charset="0"/>
-              </a:rPr>
-              <a:t> was found! We’re ready to code</a:t>
-            </a:r>
-            <a:r>
-              <a:rPr lang="en-US" dirty="0" smtClean="0">
-                <a:latin typeface="Consolas" panose="020B0609020204030204" pitchFamily="49" charset="0"/>
-              </a:rPr>
-              <a:t>.</a:t>
-            </a:r>
-          </a:p>
-          <a:p>
-            <a:r>
-              <a:rPr lang="en-US" dirty="0" smtClean="0">
-                <a:latin typeface="Consolas" panose="020B0609020204030204" pitchFamily="49" charset="0"/>
-              </a:rPr>
-              <a:t>If you see “command not found”, the path was not entered properly, or you did not close and reopen your command window so the new setting can take effect.</a:t>
-            </a:r>
-            <a:endParaRPr lang="en-US" dirty="0">
-              <a:latin typeface="Consolas" panose="020B0609020204030204" pitchFamily="49" charset="0"/>
-            </a:endParaRPr>
-          </a:p>
-        </p:txBody>
-      </p:sp>
+              <a:t>I Choose to extract the .zip file to C:\repos\java_jdk\</a:t>
+            </a:r>
+          </a:p>
+          <a:p>
+            <a:r>
+              <a:rPr lang="en-US" sz="2000" dirty="0"/>
+              <a:t>C:\repos\java_jdk\jdk-14.0.2\bin</a:t>
+            </a:r>
+            <a:endParaRPr lang="en-US" sz="2400" dirty="0"/>
+          </a:p>
+        </p:txBody>
+      </p:sp>
+      <p:pic>
+        <p:nvPicPr>
+          <p:cNvPr id="2" name="Picture 1"/>
+          <p:cNvPicPr>
+            <a:picLocks noChangeAspect="1"/>
+          </p:cNvPicPr>
+          <p:nvPr/>
+        </p:nvPicPr>
+        <p:blipFill>
+          <a:blip r:embed="rId2"/>
+          <a:stretch>
+            <a:fillRect/>
+          </a:stretch>
+        </p:blipFill>
+        <p:spPr>
+          <a:xfrm>
+            <a:off x="4224952" y="825909"/>
+            <a:ext cx="7846374" cy="4660491"/>
+          </a:xfrm>
+          <a:prstGeom prst="rect">
+            <a:avLst/>
+          </a:prstGeom>
+        </p:spPr>
+      </p:pic>
     </p:spTree>
     <p:extLst>
       <p:ext uri="{BB962C8B-B14F-4D97-AF65-F5344CB8AC3E}">
-        <p14:creationId xmlns:p14="http://schemas.microsoft.com/office/powerpoint/2010/main" val="33758336"/>
+        <p14:creationId xmlns:p14="http://schemas.microsoft.com/office/powerpoint/2010/main" val="1161958074"/>
       </p:ext>
     </p:extLst>
   </p:cSld>
@@ -3358,7 +3342,11 @@
           <a:p>
             <a:r>
               <a:rPr lang="en-US" dirty="0" smtClean="0"/>
-              <a:t>Now download our Editor – VS Code</a:t>
+              <a:t>Test path works </a:t>
+            </a:r>
+            <a:r>
+              <a:rPr lang="en-US" dirty="0" smtClean="0"/>
+              <a:t>properly, open a *new*</a:t>
             </a:r>
             <a:endParaRPr lang="en-US" dirty="0"/>
           </a:p>
@@ -3381,24 +3369,114 @@
           <a:p>
             <a:r>
               <a:rPr lang="en-US" dirty="0" smtClean="0"/>
-              <a:t>Download and install VS Code (Win + OS X + Linux)</a:t>
-            </a:r>
-          </a:p>
-          <a:p>
+              <a:t>Open an command window and type “</a:t>
+            </a:r>
+            <a:r>
+              <a:rPr lang="en-US" dirty="0" err="1" smtClean="0"/>
+              <a:t>javac</a:t>
+            </a:r>
+            <a:r>
+              <a:rPr lang="en-US" dirty="0" smtClean="0"/>
+              <a:t>” (java compiler)</a:t>
+            </a:r>
+          </a:p>
+          <a:p>
+            <a:r>
+              <a:rPr lang="en-US" dirty="0" smtClean="0">
+                <a:latin typeface="Consolas" panose="020B0609020204030204" pitchFamily="49" charset="0"/>
+              </a:rPr>
+              <a:t>C</a:t>
+            </a:r>
             <a:r>
               <a:rPr lang="en-US" dirty="0">
-                <a:hlinkClick r:id="rId2"/>
+                <a:latin typeface="Consolas" panose="020B0609020204030204" pitchFamily="49" charset="0"/>
               </a:rPr>
-              <a:t>https://code.visualstudio.com/download</a:t>
-            </a:r>
-            <a:endParaRPr lang="en-US" dirty="0"/>
+              <a:t>:\Users\user&gt;javac</a:t>
+            </a:r>
+          </a:p>
+          <a:p>
+            <a:pPr marL="0" indent="0">
+              <a:buNone/>
+            </a:pPr>
+            <a:r>
+              <a:rPr lang="en-US" dirty="0" smtClean="0">
+                <a:latin typeface="Consolas" panose="020B0609020204030204" pitchFamily="49" charset="0"/>
+              </a:rPr>
+              <a:t>	Usage</a:t>
+            </a:r>
+            <a:r>
+              <a:rPr lang="en-US" dirty="0">
+                <a:latin typeface="Consolas" panose="020B0609020204030204" pitchFamily="49" charset="0"/>
+              </a:rPr>
+              <a:t>: </a:t>
+            </a:r>
+            <a:r>
+              <a:rPr lang="en-US" dirty="0" err="1">
+                <a:latin typeface="Consolas" panose="020B0609020204030204" pitchFamily="49" charset="0"/>
+              </a:rPr>
+              <a:t>javac</a:t>
+            </a:r>
+            <a:r>
+              <a:rPr lang="en-US" dirty="0">
+                <a:latin typeface="Consolas" panose="020B0609020204030204" pitchFamily="49" charset="0"/>
+              </a:rPr>
+              <a:t> &lt;options&gt; &lt;source files&gt;</a:t>
+            </a:r>
+          </a:p>
+          <a:p>
+            <a:pPr marL="0" indent="0">
+              <a:buNone/>
+            </a:pPr>
+            <a:r>
+              <a:rPr lang="en-US" dirty="0" smtClean="0">
+                <a:latin typeface="Consolas" panose="020B0609020204030204" pitchFamily="49" charset="0"/>
+              </a:rPr>
+              <a:t>	where </a:t>
+            </a:r>
+            <a:r>
+              <a:rPr lang="en-US" dirty="0">
+                <a:latin typeface="Consolas" panose="020B0609020204030204" pitchFamily="49" charset="0"/>
+              </a:rPr>
+              <a:t>possible options include</a:t>
+            </a:r>
+            <a:r>
+              <a:rPr lang="en-US" dirty="0" smtClean="0">
+                <a:latin typeface="Consolas" panose="020B0609020204030204" pitchFamily="49" charset="0"/>
+              </a:rPr>
+              <a:t>:</a:t>
+            </a:r>
+          </a:p>
+          <a:p>
+            <a:r>
+              <a:rPr lang="en-US" dirty="0" err="1" smtClean="0">
+                <a:latin typeface="Consolas" panose="020B0609020204030204" pitchFamily="49" charset="0"/>
+              </a:rPr>
+              <a:t>Javac</a:t>
+            </a:r>
+            <a:r>
+              <a:rPr lang="en-US" dirty="0" smtClean="0">
+                <a:latin typeface="Consolas" panose="020B0609020204030204" pitchFamily="49" charset="0"/>
+              </a:rPr>
+              <a:t> was found! We’re ready to code.</a:t>
+            </a:r>
+          </a:p>
+          <a:p>
+            <a:r>
+              <a:rPr lang="en-US" dirty="0" smtClean="0">
+                <a:latin typeface="Consolas" panose="020B0609020204030204" pitchFamily="49" charset="0"/>
+              </a:rPr>
+              <a:t>If you see “command not found”, the path was not entered properly, or you did not close and reopen your command window so the new setting can take effect.</a:t>
+            </a:r>
+            <a:endParaRPr lang="en-US" dirty="0">
+              <a:latin typeface="Consolas" panose="020B0609020204030204" pitchFamily="49" charset="0"/>
+            </a:endParaRPr>
           </a:p>
         </p:txBody>
       </p:sp>
     </p:spTree>
     <p:extLst>
       <p:ext uri="{BB962C8B-B14F-4D97-AF65-F5344CB8AC3E}">
-        <p14:creationId xmlns:p14="http://schemas.microsoft.com/office/powerpoint/2010/main" val="3666314435"/>
+        <p14:creationId xmlns:p14="http://schemas.microsoft.com/office/powerpoint/2010/main" val="33758336"/>
       </p:ext>
     </p:extLst>
   </p:cSld>
@@ -3442,7 +3520,7 @@
           <a:p>
             <a:r>
               <a:rPr lang="en-US" dirty="0" smtClean="0"/>
-              <a:t>Install the Java Language Support Plugin for VS Code</a:t>
+              <a:t>Now download our Editor – VS Code</a:t>
             </a:r>
             <a:endParaRPr lang="en-US" dirty="0"/>
           </a:p>
@@ -3465,52 +3543,68 @@
           <a:p>
             <a:r>
               <a:rPr lang="en-US" dirty="0" smtClean="0"/>
-              <a:t>In the Extensions bar (</a:t>
-            </a:r>
-            <a:r>
-              <a:rPr lang="en-US" dirty="0" err="1" smtClean="0"/>
-              <a:t>Crtl</a:t>
-            </a:r>
-            <a:r>
-              <a:rPr lang="en-US" dirty="0" smtClean="0"/>
-              <a:t> – Shift – X) search for “Java”</a:t>
-            </a:r>
-          </a:p>
-          <a:p>
-            <a:r>
-              <a:rPr lang="en-US" dirty="0" smtClean="0"/>
-              <a:t>Choose “Language Support for Java™ by Red Hat”, Click Install</a:t>
-            </a:r>
-          </a:p>
-          <a:p>
+              <a:t>Download and install VS Code (Win + OS X + Linux)</a:t>
+            </a:r>
+          </a:p>
+          <a:p>
+            <a:r>
+              <a:rPr lang="en-US" dirty="0">
+                <a:hlinkClick r:id="rId2"/>
+              </a:rPr>
+              <a:t>https://code.visualstudio.com/download</a:t>
+            </a:r>
             <a:endParaRPr lang="en-US" dirty="0"/>
           </a:p>
         </p:txBody>
       </p:sp>
+    </p:spTree>
+    <p:extLst>
+      <p:ext uri="{BB962C8B-B14F-4D97-AF65-F5344CB8AC3E}">
+        <p14:creationId xmlns:p14="http://schemas.microsoft.com/office/powerpoint/2010/main" val="3666314435"/>
+      </p:ext>
+    </p:extLst>
+  </p:cSld>
+  <p:clrMapOvr>
+    <a:masterClrMapping/>
+  </p:clrMapOvr>
+</p:sld>
+</file>
+
+<file path=ppt/slides/slide6.xml><?xml version="1.0" encoding="utf-8"?>
+<p:sld xmlns:a="http://schemas.openxmlformats.org/drawingml/2006/main" xmlns:r="http://schemas.openxmlformats.org/officeDocument/2006/relationships" xmlns:p="http://schemas.openxmlformats.org/presentationml/2006/main">
+  <p:cSld>
+    <p:spTree>
+      <p:nvGrpSpPr>
+        <p:cNvPr id="1" name=""/>
+        <p:cNvGrpSpPr/>
+        <p:nvPr/>
+      </p:nvGrpSpPr>
+      <p:grpSpPr>
+        <a:xfrm>
+          <a:off x="0" y="0"/>
+          <a:ext cx="0" cy="0"/>
+          <a:chOff x="0" y="0"/>
+          <a:chExt cx="0" cy="0"/>
+        </a:xfrm>
+      </p:grpSpPr>
       <p:pic>
         <p:nvPicPr>
-          <p:cNvPr id="4" name="Picture 3"/>
+          <p:cNvPr id="6" name="Picture 5"/>
           <p:cNvPicPr>
             <a:picLocks noChangeAspect="1"/>
           </p:cNvPicPr>
           <p:nvPr/>
         </p:nvPicPr>
         <p:blipFill>
-          <a:blip r:embed="rId2" cstate="print">
-            <a:extLst>
-              <a:ext uri="{28A0092B-C50C-407E-A947-70E740481C1C}">
-                <a14:useLocalDpi xmlns:a14="http://schemas.microsoft.com/office/drawing/2010/main" val="0"/>
-              </a:ext>
-            </a:extLst>
-          </a:blip>
+          <a:blip r:embed="rId2"/>
           <a:stretch>
             <a:fillRect/>
           </a:stretch>
         </p:blipFill>
         <p:spPr>
           <a:xfrm>
-            <a:off x="1300635" y="2779117"/>
-            <a:ext cx="10188696" cy="5465811"/>
+            <a:off x="5161935" y="1005747"/>
+            <a:ext cx="7030065" cy="5852253"/>
           </a:xfrm>
           <a:prstGeom prst="rect">
             <a:avLst/>
@@ -3519,14 +3613,81 @@
       </p:pic>
       <p:sp>
         <p:nvSpPr>
+          <p:cNvPr id="2" name="Title 1"/>
+          <p:cNvSpPr>
+            <a:spLocks noGrp="1"/>
+          </p:cNvSpPr>
+          <p:nvPr>
+            <p:ph type="title"/>
+          </p:nvPr>
+        </p:nvSpPr>
+        <p:spPr/>
+        <p:txBody>
+          <a:bodyPr/>
+          <a:lstStyle/>
+          <a:p>
+            <a:r>
+              <a:rPr lang="en-US" dirty="0" smtClean="0"/>
+              <a:t>Install the Java Language Support Plugin for VS Code</a:t>
+            </a:r>
+            <a:endParaRPr lang="en-US" dirty="0"/>
+          </a:p>
+        </p:txBody>
+      </p:sp>
+      <p:sp>
+        <p:nvSpPr>
+          <p:cNvPr id="3" name="Content Placeholder 2"/>
+          <p:cNvSpPr>
+            <a:spLocks noGrp="1"/>
+          </p:cNvSpPr>
+          <p:nvPr>
+            <p:ph idx="1"/>
+          </p:nvPr>
+        </p:nvSpPr>
+        <p:spPr>
+          <a:xfrm>
+            <a:off x="838199" y="1825625"/>
+            <a:ext cx="4323735" cy="4351338"/>
+          </a:xfrm>
+        </p:spPr>
+        <p:txBody>
+          <a:bodyPr/>
+          <a:lstStyle/>
+          <a:p>
+            <a:r>
+              <a:rPr lang="en-US" dirty="0" smtClean="0"/>
+              <a:t>In the Extensions bar (</a:t>
+            </a:r>
+            <a:r>
+              <a:rPr lang="en-US" dirty="0" err="1" smtClean="0"/>
+              <a:t>Crtl</a:t>
+            </a:r>
+            <a:r>
+              <a:rPr lang="en-US" dirty="0" smtClean="0"/>
+              <a:t> – Shift – X) search for “Java”</a:t>
+            </a:r>
+          </a:p>
+          <a:p>
+            <a:r>
+              <a:rPr lang="en-US" dirty="0" smtClean="0"/>
+              <a:t>Choose “Java Extension Pack”, Click Install</a:t>
+            </a:r>
+          </a:p>
+          <a:p>
+            <a:endParaRPr lang="en-US" dirty="0"/>
+          </a:p>
+        </p:txBody>
+      </p:sp>
+      <p:sp>
+        <p:nvSpPr>
           <p:cNvPr id="5" name="Oval 4"/>
           <p:cNvSpPr/>
           <p:nvPr/>
         </p:nvSpPr>
         <p:spPr>
           <a:xfrm>
-            <a:off x="5395658" y="3832106"/>
-            <a:ext cx="1507713" cy="509550"/>
+            <a:off x="9130501" y="2495589"/>
+            <a:ext cx="1115296" cy="443435"/>
           </a:xfrm>
           <a:prstGeom prst="ellipse">
             <a:avLst/>
@@ -3567,237 +3728,6 @@
     <p:extLst>
       <p:ext uri="{BB962C8B-B14F-4D97-AF65-F5344CB8AC3E}">
         <p14:creationId xmlns:p14="http://schemas.microsoft.com/office/powerpoint/2010/main" val="1403667444"/>
-      </p:ext>
-    </p:extLst>
-  </p:cSld>
-  <p:clrMapOvr>
-    <a:masterClrMapping/>
-  </p:clrMapOvr>
-</p:sld>
-</file>
-
-<file path=ppt/slides/slide6.xml><?xml version="1.0" encoding="utf-8"?>
-<p:sld xmlns:a="http://schemas.openxmlformats.org/drawingml/2006/main" xmlns:r="http://schemas.openxmlformats.org/officeDocument/2006/relationships" xmlns:p="http://schemas.openxmlformats.org/presentationml/2006/main">
-  <p:cSld>
-    <p:spTree>
-      <p:nvGrpSpPr>
-        <p:cNvPr id="1" name=""/>
-        <p:cNvGrpSpPr/>
-        <p:nvPr/>
-      </p:nvGrpSpPr>
-      <p:grpSpPr>
-        <a:xfrm>
-          <a:off x="0" y="0"/>
-          <a:ext cx="0" cy="0"/>
-          <a:chOff x="0" y="0"/>
-          <a:chExt cx="0" cy="0"/>
-        </a:xfrm>
-      </p:grpSpPr>
-      <p:sp>
-        <p:nvSpPr>
-          <p:cNvPr id="2" name="Title 1"/>
-          <p:cNvSpPr>
-            <a:spLocks noGrp="1"/>
-          </p:cNvSpPr>
-          <p:nvPr>
-            <p:ph type="title"/>
-          </p:nvPr>
-        </p:nvSpPr>
-        <p:spPr/>
-        <p:txBody>
-          <a:bodyPr/>
-          <a:lstStyle/>
-          <a:p>
-            <a:r>
-              <a:rPr lang="en-US" dirty="0" smtClean="0"/>
-              <a:t>Set default terminal console to “integrated”</a:t>
-            </a:r>
-            <a:endParaRPr lang="en-US" dirty="0"/>
-          </a:p>
-        </p:txBody>
-      </p:sp>
-      <p:sp>
-        <p:nvSpPr>
-          <p:cNvPr id="3" name="Content Placeholder 2"/>
-          <p:cNvSpPr>
-            <a:spLocks noGrp="1"/>
-          </p:cNvSpPr>
-          <p:nvPr>
-            <p:ph idx="1"/>
-          </p:nvPr>
-        </p:nvSpPr>
-        <p:spPr/>
-        <p:txBody>
-          <a:bodyPr/>
-          <a:lstStyle/>
-          <a:p>
-            <a:r>
-              <a:rPr lang="en-US" dirty="0" smtClean="0"/>
-              <a:t>Default setting doesn’t let us type input from keyboard into the debug window. We want to change this so we have a normal terminal when we debug our programs.</a:t>
-            </a:r>
-          </a:p>
-          <a:p>
-            <a:r>
-              <a:rPr lang="en-US" dirty="0"/>
-              <a:t>File -&gt; Preferences -&gt; </a:t>
-            </a:r>
-            <a:r>
-              <a:rPr lang="en-US" dirty="0" smtClean="0"/>
-              <a:t>Settings</a:t>
-            </a:r>
-            <a:endParaRPr lang="en-US" dirty="0"/>
-          </a:p>
-          <a:p>
-            <a:r>
-              <a:rPr lang="en-US" dirty="0"/>
-              <a:t>Workspace -&gt; Extensions -&gt; Java Debugger -&gt; "Java &gt; Debug &gt; Settings: Console" </a:t>
-            </a:r>
-          </a:p>
-          <a:p>
-            <a:r>
-              <a:rPr lang="en-US" dirty="0"/>
-              <a:t>      Set to "</a:t>
-            </a:r>
-            <a:r>
-              <a:rPr lang="en-US" dirty="0" err="1"/>
-              <a:t>integratedTerminal</a:t>
-            </a:r>
-            <a:r>
-              <a:rPr lang="en-US" dirty="0"/>
-              <a:t>" from the drop down box:</a:t>
-            </a:r>
-          </a:p>
-        </p:txBody>
-      </p:sp>
-    </p:spTree>
-    <p:extLst>
-      <p:ext uri="{BB962C8B-B14F-4D97-AF65-F5344CB8AC3E}">
-        <p14:creationId xmlns:p14="http://schemas.microsoft.com/office/powerpoint/2010/main" val="3055657403"/>
-      </p:ext>
-    </p:extLst>
-  </p:cSld>
-  <p:clrMapOvr>
-    <a:masterClrMapping/>
-  </p:clrMapOvr>
-</p:sld>
-</file>
-
-<file path=ppt/slides/slide7.xml><?xml version="1.0" encoding="utf-8"?>
-<p:sld xmlns:a="http://schemas.openxmlformats.org/drawingml/2006/main" xmlns:r="http://schemas.openxmlformats.org/officeDocument/2006/relationships" xmlns:p="http://schemas.openxmlformats.org/presentationml/2006/main">
-  <p:cSld>
-    <p:spTree>
-      <p:nvGrpSpPr>
-        <p:cNvPr id="1" name=""/>
-        <p:cNvGrpSpPr/>
-        <p:nvPr/>
-      </p:nvGrpSpPr>
-      <p:grpSpPr>
-        <a:xfrm>
-          <a:off x="0" y="0"/>
-          <a:ext cx="0" cy="0"/>
-          <a:chOff x="0" y="0"/>
-          <a:chExt cx="0" cy="0"/>
-        </a:xfrm>
-      </p:grpSpPr>
-      <p:sp>
-        <p:nvSpPr>
-          <p:cNvPr id="2" name="Title 1"/>
-          <p:cNvSpPr>
-            <a:spLocks noGrp="1"/>
-          </p:cNvSpPr>
-          <p:nvPr>
-            <p:ph type="title"/>
-          </p:nvPr>
-        </p:nvSpPr>
-        <p:spPr/>
-        <p:txBody>
-          <a:bodyPr/>
-          <a:lstStyle/>
-          <a:p>
-            <a:endParaRPr lang="en-US"/>
-          </a:p>
-        </p:txBody>
-      </p:sp>
-      <p:pic>
-        <p:nvPicPr>
-          <p:cNvPr id="4" name="Picture 3"/>
-          <p:cNvPicPr>
-            <a:picLocks noChangeAspect="1"/>
-          </p:cNvPicPr>
-          <p:nvPr/>
-        </p:nvPicPr>
-        <p:blipFill>
-          <a:blip r:embed="rId2">
-            <a:extLst>
-              <a:ext uri="{28A0092B-C50C-407E-A947-70E740481C1C}">
-                <a14:useLocalDpi xmlns:a14="http://schemas.microsoft.com/office/drawing/2010/main" val="0"/>
-              </a:ext>
-            </a:extLst>
-          </a:blip>
-          <a:stretch>
-            <a:fillRect/>
-          </a:stretch>
-        </p:blipFill>
-        <p:spPr>
-          <a:xfrm>
-            <a:off x="1803400" y="644525"/>
-            <a:ext cx="8585200" cy="5568950"/>
-          </a:xfrm>
-          <a:prstGeom prst="rect">
-            <a:avLst/>
-          </a:prstGeom>
-        </p:spPr>
-      </p:pic>
-      <p:sp>
-        <p:nvSpPr>
-          <p:cNvPr id="5" name="Oval 4"/>
-          <p:cNvSpPr/>
-          <p:nvPr/>
-        </p:nvSpPr>
-        <p:spPr>
-          <a:xfrm>
-            <a:off x="2910724" y="2952605"/>
-            <a:ext cx="4676702" cy="1333209"/>
-          </a:xfrm>
-          <a:prstGeom prst="ellipse">
-            <a:avLst/>
-          </a:prstGeom>
-          <a:noFill/>
-          <a:ln w="63500">
-            <a:solidFill>
-              <a:srgbClr val="FF0000"/>
-            </a:solidFill>
-          </a:ln>
-        </p:spPr>
-        <p:style>
-          <a:lnRef idx="2">
-            <a:schemeClr val="accent1">
-              <a:shade val="50000"/>
-            </a:schemeClr>
-          </a:lnRef>
-          <a:fillRef idx="1">
-            <a:schemeClr val="accent1"/>
-          </a:fillRef>
-          <a:effectRef idx="0">
-            <a:schemeClr val="accent1"/>
-          </a:effectRef>
-          <a:fontRef idx="minor">
-            <a:schemeClr val="lt1"/>
-          </a:fontRef>
-        </p:style>
-        <p:txBody>
-          <a:bodyPr rtlCol="0" anchor="ctr"/>
-          <a:lstStyle/>
-          <a:p>
-            <a:pPr algn="ctr"/>
-            <a:endParaRPr lang="en-US"/>
-          </a:p>
-        </p:txBody>
-      </p:sp>
-    </p:spTree>
-    <p:extLst>
-      <p:ext uri="{BB962C8B-B14F-4D97-AF65-F5344CB8AC3E}">
-        <p14:creationId xmlns:p14="http://schemas.microsoft.com/office/powerpoint/2010/main" val="4201709271"/>
       </p:ext>
     </p:extLst>
   </p:cSld>

</xml_diff>